<commit_message>
added professional meeting summary to project journal with a .md file and the presentation used to discuss progress
</commit_message>
<xml_diff>
--- a/project_journal/standup/sprint2_standup.pptx
+++ b/project_journal/standup/sprint2_standup.pptx
@@ -24,6 +24,11 @@
     <p:sldId id="274" r:id="rId18"/>
     <p:sldId id="270" r:id="rId19"/>
     <p:sldId id="271" r:id="rId20"/>
+    <p:sldId id="275" r:id="rId21"/>
+    <p:sldId id="276" r:id="rId22"/>
+    <p:sldId id="277" r:id="rId23"/>
+    <p:sldId id="278" r:id="rId24"/>
+    <p:sldId id="279" r:id="rId25"/>
   </p:sldIdLst>
   <p:sldSz cx="12192000" cy="6858000"/>
   <p:notesSz cx="6858000" cy="9144000"/>
@@ -277,7 +282,7 @@
           <a:p>
             <a:fld id="{C5760A9E-F5D7-4040-B515-3D966B4E754C}" type="datetimeFigureOut">
               <a:rPr lang="en-US" smtClean="0"/>
-              <a:t>5/20/2025</a:t>
+              <a:t>5/25/2025</a:t>
             </a:fld>
             <a:endParaRPr lang="en-US"/>
           </a:p>
@@ -475,7 +480,7 @@
           <a:p>
             <a:fld id="{C5760A9E-F5D7-4040-B515-3D966B4E754C}" type="datetimeFigureOut">
               <a:rPr lang="en-US" smtClean="0"/>
-              <a:t>5/20/2025</a:t>
+              <a:t>5/25/2025</a:t>
             </a:fld>
             <a:endParaRPr lang="en-US"/>
           </a:p>
@@ -683,7 +688,7 @@
           <a:p>
             <a:fld id="{C5760A9E-F5D7-4040-B515-3D966B4E754C}" type="datetimeFigureOut">
               <a:rPr lang="en-US" smtClean="0"/>
-              <a:t>5/20/2025</a:t>
+              <a:t>5/25/2025</a:t>
             </a:fld>
             <a:endParaRPr lang="en-US"/>
           </a:p>
@@ -881,7 +886,7 @@
           <a:p>
             <a:fld id="{C5760A9E-F5D7-4040-B515-3D966B4E754C}" type="datetimeFigureOut">
               <a:rPr lang="en-US" smtClean="0"/>
-              <a:t>5/20/2025</a:t>
+              <a:t>5/25/2025</a:t>
             </a:fld>
             <a:endParaRPr lang="en-US"/>
           </a:p>
@@ -1156,7 +1161,7 @@
           <a:p>
             <a:fld id="{C5760A9E-F5D7-4040-B515-3D966B4E754C}" type="datetimeFigureOut">
               <a:rPr lang="en-US" smtClean="0"/>
-              <a:t>5/20/2025</a:t>
+              <a:t>5/25/2025</a:t>
             </a:fld>
             <a:endParaRPr lang="en-US"/>
           </a:p>
@@ -1421,7 +1426,7 @@
           <a:p>
             <a:fld id="{C5760A9E-F5D7-4040-B515-3D966B4E754C}" type="datetimeFigureOut">
               <a:rPr lang="en-US" smtClean="0"/>
-              <a:t>5/20/2025</a:t>
+              <a:t>5/25/2025</a:t>
             </a:fld>
             <a:endParaRPr lang="en-US"/>
           </a:p>
@@ -1833,7 +1838,7 @@
           <a:p>
             <a:fld id="{C5760A9E-F5D7-4040-B515-3D966B4E754C}" type="datetimeFigureOut">
               <a:rPr lang="en-US" smtClean="0"/>
-              <a:t>5/20/2025</a:t>
+              <a:t>5/25/2025</a:t>
             </a:fld>
             <a:endParaRPr lang="en-US"/>
           </a:p>
@@ -1974,7 +1979,7 @@
           <a:p>
             <a:fld id="{C5760A9E-F5D7-4040-B515-3D966B4E754C}" type="datetimeFigureOut">
               <a:rPr lang="en-US" smtClean="0"/>
-              <a:t>5/20/2025</a:t>
+              <a:t>5/25/2025</a:t>
             </a:fld>
             <a:endParaRPr lang="en-US"/>
           </a:p>
@@ -2087,7 +2092,7 @@
           <a:p>
             <a:fld id="{C5760A9E-F5D7-4040-B515-3D966B4E754C}" type="datetimeFigureOut">
               <a:rPr lang="en-US" smtClean="0"/>
-              <a:t>5/20/2025</a:t>
+              <a:t>5/25/2025</a:t>
             </a:fld>
             <a:endParaRPr lang="en-US"/>
           </a:p>
@@ -2398,7 +2403,7 @@
           <a:p>
             <a:fld id="{C5760A9E-F5D7-4040-B515-3D966B4E754C}" type="datetimeFigureOut">
               <a:rPr lang="en-US" smtClean="0"/>
-              <a:t>5/20/2025</a:t>
+              <a:t>5/25/2025</a:t>
             </a:fld>
             <a:endParaRPr lang="en-US"/>
           </a:p>
@@ -2686,7 +2691,7 @@
           <a:p>
             <a:fld id="{C5760A9E-F5D7-4040-B515-3D966B4E754C}" type="datetimeFigureOut">
               <a:rPr lang="en-US" smtClean="0"/>
-              <a:t>5/20/2025</a:t>
+              <a:t>5/25/2025</a:t>
             </a:fld>
             <a:endParaRPr lang="en-US"/>
           </a:p>
@@ -2927,7 +2932,7 @@
           <a:p>
             <a:fld id="{C5760A9E-F5D7-4040-B515-3D966B4E754C}" type="datetimeFigureOut">
               <a:rPr lang="en-US" smtClean="0"/>
-              <a:t>5/20/2025</a:t>
+              <a:t>5/25/2025</a:t>
             </a:fld>
             <a:endParaRPr lang="en-US"/>
           </a:p>
@@ -3764,7 +3769,7 @@
           <a:p>
             <a:r>
               <a:rPr lang="en-US" dirty="0"/>
-              <a:t>Agenda --- 5/21 Tuesday (Day #3)</a:t>
+              <a:t>Agenda --- 5/21 Wed + Thu (Day #3-4)</a:t>
             </a:r>
           </a:p>
         </p:txBody>
@@ -3790,7 +3795,30 @@
           <a:bodyPr/>
           <a:lstStyle/>
           <a:p>
-            <a:endParaRPr lang="en-US"/>
+            <a:r>
+              <a:rPr lang="en-US" dirty="0"/>
+              <a:t>Discuss timelines created (rough/comprehensive timeline + immediate/detailed timeline)</a:t>
+            </a:r>
+          </a:p>
+          <a:p>
+            <a:r>
+              <a:rPr lang="en-US" dirty="0"/>
+              <a:t>Finally trying to implement the static </a:t>
+            </a:r>
+            <a:r>
+              <a:rPr lang="en-US" dirty="0" err="1"/>
+              <a:t>ui</a:t>
+            </a:r>
+            <a:r>
+              <a:rPr lang="en-US" dirty="0"/>
+              <a:t> elements to web page (actually coding)</a:t>
+            </a:r>
+          </a:p>
+          <a:p>
+            <a:endParaRPr lang="en-US" dirty="0"/>
+          </a:p>
+          <a:p>
+            <a:endParaRPr lang="en-US" dirty="0"/>
           </a:p>
         </p:txBody>
       </p:sp>
@@ -3873,7 +3901,23 @@
           <a:bodyPr/>
           <a:lstStyle/>
           <a:p>
-            <a:endParaRPr lang="en-US"/>
+            <a:r>
+              <a:rPr lang="en-US" dirty="0"/>
+              <a:t>Completed rough and immediate timelines</a:t>
+            </a:r>
+          </a:p>
+          <a:p>
+            <a:r>
+              <a:rPr lang="en-US" dirty="0"/>
+              <a:t>Finished “Introduction to Solo-scrum” backlog item</a:t>
+            </a:r>
+          </a:p>
+          <a:p>
+            <a:pPr lvl="1"/>
+            <a:r>
+              <a:rPr lang="en-US" dirty="0"/>
+              <a:t>2 items left to go</a:t>
+            </a:r>
           </a:p>
         </p:txBody>
       </p:sp>
@@ -4394,7 +4438,16 @@
           <a:bodyPr/>
           <a:lstStyle/>
           <a:p>
-            <a:endParaRPr lang="en-US" dirty="0"/>
+            <a:r>
+              <a:rPr lang="en-US" dirty="0"/>
+              <a:t>Still don’t have a strong understanding of React</a:t>
+            </a:r>
+          </a:p>
+          <a:p>
+            <a:r>
+              <a:rPr lang="en-US" dirty="0"/>
+              <a:t>Timeline is a little tight so it might not work</a:t>
+            </a:r>
           </a:p>
         </p:txBody>
       </p:sp>
@@ -4477,7 +4530,46 @@
           <a:bodyPr/>
           <a:lstStyle/>
           <a:p>
-            <a:endParaRPr lang="en-US"/>
+            <a:r>
+              <a:rPr lang="en-US" dirty="0"/>
+              <a:t>Add static </a:t>
+            </a:r>
+            <a:r>
+              <a:rPr lang="en-US" dirty="0" err="1"/>
+              <a:t>ui</a:t>
+            </a:r>
+            <a:r>
+              <a:rPr lang="en-US" dirty="0"/>
+              <a:t> components to web app</a:t>
+            </a:r>
+          </a:p>
+          <a:p>
+            <a:pPr lvl="1"/>
+            <a:r>
+              <a:rPr lang="en-US" dirty="0"/>
+              <a:t>Table</a:t>
+            </a:r>
+          </a:p>
+          <a:p>
+            <a:pPr lvl="1"/>
+            <a:r>
+              <a:rPr lang="en-US" dirty="0"/>
+              <a:t>Stat cards</a:t>
+            </a:r>
+          </a:p>
+          <a:p>
+            <a:pPr lvl="1"/>
+            <a:r>
+              <a:rPr lang="en-US" dirty="0"/>
+              <a:t>Major feedback section</a:t>
+            </a:r>
+          </a:p>
+          <a:p>
+            <a:pPr lvl="1"/>
+            <a:r>
+              <a:rPr lang="en-US" dirty="0"/>
+              <a:t>Submit button</a:t>
+            </a:r>
           </a:p>
         </p:txBody>
       </p:sp>
@@ -4571,6 +4663,628 @@
     <p:extLst>
       <p:ext uri="{BB962C8B-B14F-4D97-AF65-F5344CB8AC3E}">
         <p14:creationId xmlns:p14="http://schemas.microsoft.com/office/powerpoint/2010/main" val="3276967932"/>
+      </p:ext>
+    </p:extLst>
+  </p:cSld>
+  <p:clrMapOvr>
+    <a:masterClrMapping/>
+  </p:clrMapOvr>
+</p:sld>
+</file>
+
+<file path=ppt/slides/slide20.xml><?xml version="1.0" encoding="utf-8"?>
+<p:sld xmlns:a="http://schemas.openxmlformats.org/drawingml/2006/main" xmlns:r="http://schemas.openxmlformats.org/officeDocument/2006/relationships" xmlns:p="http://schemas.openxmlformats.org/presentationml/2006/main">
+  <p:cSld>
+    <p:spTree>
+      <p:nvGrpSpPr>
+        <p:cNvPr id="1" name=""/>
+        <p:cNvGrpSpPr/>
+        <p:nvPr/>
+      </p:nvGrpSpPr>
+      <p:grpSpPr>
+        <a:xfrm>
+          <a:off x="0" y="0"/>
+          <a:ext cx="0" cy="0"/>
+          <a:chOff x="0" y="0"/>
+          <a:chExt cx="0" cy="0"/>
+        </a:xfrm>
+      </p:grpSpPr>
+      <p:sp>
+        <p:nvSpPr>
+          <p:cNvPr id="2" name="Title 1">
+            <a:extLst>
+              <a:ext uri="{FF2B5EF4-FFF2-40B4-BE49-F238E27FC236}">
+                <a16:creationId xmlns:a16="http://schemas.microsoft.com/office/drawing/2014/main" id="{F6D0F334-8B75-1DAE-7C10-95FD7FAF39DC}"/>
+              </a:ext>
+            </a:extLst>
+          </p:cNvPr>
+          <p:cNvSpPr>
+            <a:spLocks noGrp="1"/>
+          </p:cNvSpPr>
+          <p:nvPr>
+            <p:ph type="title"/>
+          </p:nvPr>
+        </p:nvSpPr>
+        <p:spPr/>
+        <p:txBody>
+          <a:bodyPr/>
+          <a:lstStyle/>
+          <a:p>
+            <a:r>
+              <a:rPr lang="en-US" dirty="0"/>
+              <a:t>Agenda --- 5/24 Saturday (Day #5)</a:t>
+            </a:r>
+          </a:p>
+        </p:txBody>
+      </p:sp>
+      <p:sp>
+        <p:nvSpPr>
+          <p:cNvPr id="3" name="Content Placeholder 2">
+            <a:extLst>
+              <a:ext uri="{FF2B5EF4-FFF2-40B4-BE49-F238E27FC236}">
+                <a16:creationId xmlns:a16="http://schemas.microsoft.com/office/drawing/2014/main" id="{1460B3A6-BA98-E637-4D25-1277BACD2189}"/>
+              </a:ext>
+            </a:extLst>
+          </p:cNvPr>
+          <p:cNvSpPr>
+            <a:spLocks noGrp="1"/>
+          </p:cNvSpPr>
+          <p:nvPr>
+            <p:ph idx="1"/>
+          </p:nvPr>
+        </p:nvSpPr>
+        <p:spPr/>
+        <p:txBody>
+          <a:bodyPr>
+            <a:normAutofit lnSpcReduction="10000"/>
+          </a:bodyPr>
+          <a:lstStyle/>
+          <a:p>
+            <a:r>
+              <a:rPr lang="en-US" dirty="0"/>
+              <a:t>Introduce new backlog item: “Intro to React” (~13 hours work)</a:t>
+            </a:r>
+          </a:p>
+          <a:p>
+            <a:r>
+              <a:rPr lang="en-US" dirty="0"/>
+              <a:t>Discuss basic web app setup + reiterate over “vibe coding”</a:t>
+            </a:r>
+          </a:p>
+          <a:p>
+            <a:r>
+              <a:rPr lang="en-US" dirty="0"/>
+              <a:t>Shift in schedule</a:t>
+            </a:r>
+          </a:p>
+          <a:p>
+            <a:pPr lvl="1"/>
+            <a:r>
+              <a:rPr lang="en-US" dirty="0"/>
+              <a:t>New backlog item: work on it this and next sprint</a:t>
+            </a:r>
+          </a:p>
+          <a:p>
+            <a:pPr lvl="1"/>
+            <a:r>
+              <a:rPr lang="en-US" dirty="0"/>
+              <a:t>Finish </a:t>
+            </a:r>
+            <a:r>
+              <a:rPr lang="en-US" dirty="0" err="1"/>
+              <a:t>ui</a:t>
+            </a:r>
+            <a:r>
+              <a:rPr lang="en-US" dirty="0"/>
+              <a:t>/</a:t>
+            </a:r>
+            <a:r>
+              <a:rPr lang="en-US" dirty="0" err="1"/>
+              <a:t>ux</a:t>
+            </a:r>
+            <a:r>
+              <a:rPr lang="en-US" dirty="0"/>
+              <a:t> foundation for sprint 2</a:t>
+            </a:r>
+          </a:p>
+          <a:p>
+            <a:pPr lvl="1"/>
+            <a:r>
+              <a:rPr lang="en-US" dirty="0"/>
+              <a:t>Push data entry table to the 4th sprint, move to third if “Intro to React” is finished early</a:t>
+            </a:r>
+          </a:p>
+          <a:p>
+            <a:pPr lvl="1"/>
+            <a:r>
+              <a:rPr lang="en-US" dirty="0"/>
+              <a:t>Japan trip moved to July</a:t>
+            </a:r>
+          </a:p>
+          <a:p>
+            <a:r>
+              <a:rPr lang="en-US" dirty="0"/>
+              <a:t>Professor meeting on Wednesday</a:t>
+            </a:r>
+          </a:p>
+          <a:p>
+            <a:r>
+              <a:rPr lang="en-US" dirty="0"/>
+              <a:t>Meeting over zoom</a:t>
+            </a:r>
+          </a:p>
+        </p:txBody>
+      </p:sp>
+    </p:spTree>
+    <p:extLst>
+      <p:ext uri="{BB962C8B-B14F-4D97-AF65-F5344CB8AC3E}">
+        <p14:creationId xmlns:p14="http://schemas.microsoft.com/office/powerpoint/2010/main" val="1692034571"/>
+      </p:ext>
+    </p:extLst>
+  </p:cSld>
+  <p:clrMapOvr>
+    <a:masterClrMapping/>
+  </p:clrMapOvr>
+</p:sld>
+</file>
+
+<file path=ppt/slides/slide21.xml><?xml version="1.0" encoding="utf-8"?>
+<p:sld xmlns:a="http://schemas.openxmlformats.org/drawingml/2006/main" xmlns:r="http://schemas.openxmlformats.org/officeDocument/2006/relationships" xmlns:p="http://schemas.openxmlformats.org/presentationml/2006/main">
+  <p:cSld>
+    <p:spTree>
+      <p:nvGrpSpPr>
+        <p:cNvPr id="1" name=""/>
+        <p:cNvGrpSpPr/>
+        <p:nvPr/>
+      </p:nvGrpSpPr>
+      <p:grpSpPr>
+        <a:xfrm>
+          <a:off x="0" y="0"/>
+          <a:ext cx="0" cy="0"/>
+          <a:chOff x="0" y="0"/>
+          <a:chExt cx="0" cy="0"/>
+        </a:xfrm>
+      </p:grpSpPr>
+      <p:sp>
+        <p:nvSpPr>
+          <p:cNvPr id="2" name="Title 1">
+            <a:extLst>
+              <a:ext uri="{FF2B5EF4-FFF2-40B4-BE49-F238E27FC236}">
+                <a16:creationId xmlns:a16="http://schemas.microsoft.com/office/drawing/2014/main" id="{A33AE5D0-E518-6625-737F-A53A0726713D}"/>
+              </a:ext>
+            </a:extLst>
+          </p:cNvPr>
+          <p:cNvSpPr>
+            <a:spLocks noGrp="1"/>
+          </p:cNvSpPr>
+          <p:nvPr>
+            <p:ph type="title"/>
+          </p:nvPr>
+        </p:nvSpPr>
+        <p:spPr/>
+        <p:txBody>
+          <a:bodyPr/>
+          <a:lstStyle/>
+          <a:p>
+            <a:r>
+              <a:rPr lang="en-US" dirty="0"/>
+              <a:t>Previous Progress – Intro to React</a:t>
+            </a:r>
+          </a:p>
+        </p:txBody>
+      </p:sp>
+      <p:pic>
+        <p:nvPicPr>
+          <p:cNvPr id="11" name="Picture 10" descr="A screenshot of a computer program">
+            <a:extLst>
+              <a:ext uri="{FF2B5EF4-FFF2-40B4-BE49-F238E27FC236}">
+                <a16:creationId xmlns:a16="http://schemas.microsoft.com/office/drawing/2014/main" id="{9F52885D-A60E-664B-0341-5ADB68C76D2F}"/>
+              </a:ext>
+            </a:extLst>
+          </p:cNvPr>
+          <p:cNvPicPr>
+            <a:picLocks noChangeAspect="1"/>
+          </p:cNvPicPr>
+          <p:nvPr/>
+        </p:nvPicPr>
+        <p:blipFill>
+          <a:blip r:embed="rId2">
+            <a:extLst>
+              <a:ext uri="{28A0092B-C50C-407E-A947-70E740481C1C}">
+                <a14:useLocalDpi xmlns:a14="http://schemas.microsoft.com/office/drawing/2010/main" val="0"/>
+              </a:ext>
+            </a:extLst>
+          </a:blip>
+          <a:stretch>
+            <a:fillRect/>
+          </a:stretch>
+        </p:blipFill>
+        <p:spPr>
+          <a:xfrm>
+            <a:off x="631724" y="1270673"/>
+            <a:ext cx="6243054" cy="2947365"/>
+          </a:xfrm>
+          <a:prstGeom prst="rect">
+            <a:avLst/>
+          </a:prstGeom>
+        </p:spPr>
+      </p:pic>
+      <p:pic>
+        <p:nvPicPr>
+          <p:cNvPr id="13" name="Picture 12" descr="A screenshot of a computer">
+            <a:extLst>
+              <a:ext uri="{FF2B5EF4-FFF2-40B4-BE49-F238E27FC236}">
+                <a16:creationId xmlns:a16="http://schemas.microsoft.com/office/drawing/2014/main" id="{B552214E-706B-45A5-C5F1-09064F1C8C7D}"/>
+              </a:ext>
+            </a:extLst>
+          </p:cNvPr>
+          <p:cNvPicPr>
+            <a:picLocks noChangeAspect="1"/>
+          </p:cNvPicPr>
+          <p:nvPr/>
+        </p:nvPicPr>
+        <p:blipFill>
+          <a:blip r:embed="rId3">
+            <a:extLst>
+              <a:ext uri="{28A0092B-C50C-407E-A947-70E740481C1C}">
+                <a14:useLocalDpi xmlns:a14="http://schemas.microsoft.com/office/drawing/2010/main" val="0"/>
+              </a:ext>
+            </a:extLst>
+          </a:blip>
+          <a:stretch>
+            <a:fillRect/>
+          </a:stretch>
+        </p:blipFill>
+        <p:spPr>
+          <a:xfrm>
+            <a:off x="631724" y="4218038"/>
+            <a:ext cx="5196832" cy="2472813"/>
+          </a:xfrm>
+          <a:prstGeom prst="rect">
+            <a:avLst/>
+          </a:prstGeom>
+        </p:spPr>
+      </p:pic>
+      <p:pic>
+        <p:nvPicPr>
+          <p:cNvPr id="15" name="Picture 14" descr="A screenshot of a computer&#10;&#10;AI-generated content may be incorrect.">
+            <a:extLst>
+              <a:ext uri="{FF2B5EF4-FFF2-40B4-BE49-F238E27FC236}">
+                <a16:creationId xmlns:a16="http://schemas.microsoft.com/office/drawing/2014/main" id="{8228C082-EBF6-0562-3C58-5ACF27317E52}"/>
+              </a:ext>
+            </a:extLst>
+          </p:cNvPr>
+          <p:cNvPicPr>
+            <a:picLocks noChangeAspect="1"/>
+          </p:cNvPicPr>
+          <p:nvPr/>
+        </p:nvPicPr>
+        <p:blipFill>
+          <a:blip r:embed="rId4">
+            <a:extLst>
+              <a:ext uri="{28A0092B-C50C-407E-A947-70E740481C1C}">
+                <a14:useLocalDpi xmlns:a14="http://schemas.microsoft.com/office/drawing/2010/main" val="0"/>
+              </a:ext>
+            </a:extLst>
+          </a:blip>
+          <a:srcRect t="1" r="63797" b="-1413"/>
+          <a:stretch>
+            <a:fillRect/>
+          </a:stretch>
+        </p:blipFill>
+        <p:spPr>
+          <a:xfrm>
+            <a:off x="7081254" y="1396181"/>
+            <a:ext cx="4272546" cy="5294670"/>
+          </a:xfrm>
+          <a:prstGeom prst="rect">
+            <a:avLst/>
+          </a:prstGeom>
+        </p:spPr>
+      </p:pic>
+    </p:spTree>
+    <p:extLst>
+      <p:ext uri="{BB962C8B-B14F-4D97-AF65-F5344CB8AC3E}">
+        <p14:creationId xmlns:p14="http://schemas.microsoft.com/office/powerpoint/2010/main" val="3191241642"/>
+      </p:ext>
+    </p:extLst>
+  </p:cSld>
+  <p:clrMapOvr>
+    <a:masterClrMapping/>
+  </p:clrMapOvr>
+</p:sld>
+</file>
+
+<file path=ppt/slides/slide22.xml><?xml version="1.0" encoding="utf-8"?>
+<p:sld xmlns:a="http://schemas.openxmlformats.org/drawingml/2006/main" xmlns:r="http://schemas.openxmlformats.org/officeDocument/2006/relationships" xmlns:p="http://schemas.openxmlformats.org/presentationml/2006/main">
+  <p:cSld>
+    <p:spTree>
+      <p:nvGrpSpPr>
+        <p:cNvPr id="1" name=""/>
+        <p:cNvGrpSpPr/>
+        <p:nvPr/>
+      </p:nvGrpSpPr>
+      <p:grpSpPr>
+        <a:xfrm>
+          <a:off x="0" y="0"/>
+          <a:ext cx="0" cy="0"/>
+          <a:chOff x="0" y="0"/>
+          <a:chExt cx="0" cy="0"/>
+        </a:xfrm>
+      </p:grpSpPr>
+      <p:sp>
+        <p:nvSpPr>
+          <p:cNvPr id="2" name="Title 1">
+            <a:extLst>
+              <a:ext uri="{FF2B5EF4-FFF2-40B4-BE49-F238E27FC236}">
+                <a16:creationId xmlns:a16="http://schemas.microsoft.com/office/drawing/2014/main" id="{0454A0EE-44A0-F9B3-43E6-0631D8B82FBB}"/>
+              </a:ext>
+            </a:extLst>
+          </p:cNvPr>
+          <p:cNvSpPr>
+            <a:spLocks noGrp="1"/>
+          </p:cNvSpPr>
+          <p:nvPr>
+            <p:ph type="title"/>
+          </p:nvPr>
+        </p:nvSpPr>
+        <p:spPr/>
+        <p:txBody>
+          <a:bodyPr/>
+          <a:lstStyle/>
+          <a:p>
+            <a:r>
+              <a:rPr lang="en-US" dirty="0"/>
+              <a:t>Previous Progress – Static Implementation</a:t>
+            </a:r>
+          </a:p>
+        </p:txBody>
+      </p:sp>
+      <p:pic>
+        <p:nvPicPr>
+          <p:cNvPr id="5" name="Content Placeholder 4" descr="A screenshot of a computer">
+            <a:extLst>
+              <a:ext uri="{FF2B5EF4-FFF2-40B4-BE49-F238E27FC236}">
+                <a16:creationId xmlns:a16="http://schemas.microsoft.com/office/drawing/2014/main" id="{4066446B-1F62-7C02-6B55-9F6D1CEB7172}"/>
+              </a:ext>
+            </a:extLst>
+          </p:cNvPr>
+          <p:cNvPicPr>
+            <a:picLocks noGrp="1" noChangeAspect="1"/>
+          </p:cNvPicPr>
+          <p:nvPr>
+            <p:ph idx="1"/>
+          </p:nvPr>
+        </p:nvPicPr>
+        <p:blipFill>
+          <a:blip r:embed="rId2">
+            <a:extLst>
+              <a:ext uri="{28A0092B-C50C-407E-A947-70E740481C1C}">
+                <a14:useLocalDpi xmlns:a14="http://schemas.microsoft.com/office/drawing/2010/main" val="0"/>
+              </a:ext>
+            </a:extLst>
+          </a:blip>
+          <a:stretch>
+            <a:fillRect/>
+          </a:stretch>
+        </p:blipFill>
+        <p:spPr>
+          <a:xfrm>
+            <a:off x="325991" y="1451998"/>
+            <a:ext cx="11540018" cy="5204440"/>
+          </a:xfrm>
+        </p:spPr>
+      </p:pic>
+    </p:spTree>
+    <p:extLst>
+      <p:ext uri="{BB962C8B-B14F-4D97-AF65-F5344CB8AC3E}">
+        <p14:creationId xmlns:p14="http://schemas.microsoft.com/office/powerpoint/2010/main" val="2023973490"/>
+      </p:ext>
+    </p:extLst>
+  </p:cSld>
+  <p:clrMapOvr>
+    <a:masterClrMapping/>
+  </p:clrMapOvr>
+</p:sld>
+</file>
+
+<file path=ppt/slides/slide23.xml><?xml version="1.0" encoding="utf-8"?>
+<p:sld xmlns:a="http://schemas.openxmlformats.org/drawingml/2006/main" xmlns:r="http://schemas.openxmlformats.org/officeDocument/2006/relationships" xmlns:p="http://schemas.openxmlformats.org/presentationml/2006/main">
+  <p:cSld>
+    <p:spTree>
+      <p:nvGrpSpPr>
+        <p:cNvPr id="1" name=""/>
+        <p:cNvGrpSpPr/>
+        <p:nvPr/>
+      </p:nvGrpSpPr>
+      <p:grpSpPr>
+        <a:xfrm>
+          <a:off x="0" y="0"/>
+          <a:ext cx="0" cy="0"/>
+          <a:chOff x="0" y="0"/>
+          <a:chExt cx="0" cy="0"/>
+        </a:xfrm>
+      </p:grpSpPr>
+      <p:sp>
+        <p:nvSpPr>
+          <p:cNvPr id="2" name="Title 1">
+            <a:extLst>
+              <a:ext uri="{FF2B5EF4-FFF2-40B4-BE49-F238E27FC236}">
+                <a16:creationId xmlns:a16="http://schemas.microsoft.com/office/drawing/2014/main" id="{475AC525-24CD-1426-20AA-B12812342399}"/>
+              </a:ext>
+            </a:extLst>
+          </p:cNvPr>
+          <p:cNvSpPr>
+            <a:spLocks noGrp="1"/>
+          </p:cNvSpPr>
+          <p:nvPr>
+            <p:ph type="title"/>
+          </p:nvPr>
+        </p:nvSpPr>
+        <p:spPr/>
+        <p:txBody>
+          <a:bodyPr/>
+          <a:lstStyle/>
+          <a:p>
+            <a:r>
+              <a:rPr lang="en-US" dirty="0"/>
+              <a:t>Problems &amp; Blockers</a:t>
+            </a:r>
+          </a:p>
+        </p:txBody>
+      </p:sp>
+      <p:sp>
+        <p:nvSpPr>
+          <p:cNvPr id="3" name="Content Placeholder 2">
+            <a:extLst>
+              <a:ext uri="{FF2B5EF4-FFF2-40B4-BE49-F238E27FC236}">
+                <a16:creationId xmlns:a16="http://schemas.microsoft.com/office/drawing/2014/main" id="{6C6974FE-5658-5DE3-8949-88253D274E69}"/>
+              </a:ext>
+            </a:extLst>
+          </p:cNvPr>
+          <p:cNvSpPr>
+            <a:spLocks noGrp="1"/>
+          </p:cNvSpPr>
+          <p:nvPr>
+            <p:ph idx="1"/>
+          </p:nvPr>
+        </p:nvSpPr>
+        <p:spPr/>
+        <p:txBody>
+          <a:bodyPr/>
+          <a:lstStyle/>
+          <a:p>
+            <a:r>
+              <a:rPr lang="en-US" dirty="0"/>
+              <a:t>Still wont finish project by July but will get much closer</a:t>
+            </a:r>
+          </a:p>
+          <a:p>
+            <a:r>
+              <a:rPr lang="en-US" dirty="0"/>
+              <a:t>Might need to pay for </a:t>
+            </a:r>
+            <a:r>
+              <a:rPr lang="en-US" dirty="0" err="1"/>
+              <a:t>codeacademy</a:t>
+            </a:r>
+            <a:r>
+              <a:rPr lang="en-US" dirty="0"/>
+              <a:t> subscription – not a big problem</a:t>
+            </a:r>
+          </a:p>
+          <a:p>
+            <a:r>
+              <a:rPr lang="en-US" dirty="0"/>
+              <a:t>There is the potential for me to not know how to implement the data table backlog item even after finishing the “Intro to React” backlog item</a:t>
+            </a:r>
+          </a:p>
+          <a:p>
+            <a:r>
+              <a:rPr lang="en-US" dirty="0"/>
+              <a:t>Annoying to manually update </a:t>
+            </a:r>
+            <a:r>
+              <a:rPr lang="en-US" dirty="0" err="1"/>
+              <a:t>gantt</a:t>
+            </a:r>
+            <a:r>
+              <a:rPr lang="en-US" dirty="0"/>
+              <a:t> chart and timeline every time</a:t>
+            </a:r>
+          </a:p>
+          <a:p>
+            <a:endParaRPr lang="en-US" dirty="0"/>
+          </a:p>
+        </p:txBody>
+      </p:sp>
+    </p:spTree>
+    <p:extLst>
+      <p:ext uri="{BB962C8B-B14F-4D97-AF65-F5344CB8AC3E}">
+        <p14:creationId xmlns:p14="http://schemas.microsoft.com/office/powerpoint/2010/main" val="1883789784"/>
+      </p:ext>
+    </p:extLst>
+  </p:cSld>
+  <p:clrMapOvr>
+    <a:masterClrMapping/>
+  </p:clrMapOvr>
+</p:sld>
+</file>
+
+<file path=ppt/slides/slide24.xml><?xml version="1.0" encoding="utf-8"?>
+<p:sld xmlns:a="http://schemas.openxmlformats.org/drawingml/2006/main" xmlns:r="http://schemas.openxmlformats.org/officeDocument/2006/relationships" xmlns:p="http://schemas.openxmlformats.org/presentationml/2006/main">
+  <p:cSld>
+    <p:spTree>
+      <p:nvGrpSpPr>
+        <p:cNvPr id="1" name=""/>
+        <p:cNvGrpSpPr/>
+        <p:nvPr/>
+      </p:nvGrpSpPr>
+      <p:grpSpPr>
+        <a:xfrm>
+          <a:off x="0" y="0"/>
+          <a:ext cx="0" cy="0"/>
+          <a:chOff x="0" y="0"/>
+          <a:chExt cx="0" cy="0"/>
+        </a:xfrm>
+      </p:grpSpPr>
+      <p:sp>
+        <p:nvSpPr>
+          <p:cNvPr id="2" name="Title 1">
+            <a:extLst>
+              <a:ext uri="{FF2B5EF4-FFF2-40B4-BE49-F238E27FC236}">
+                <a16:creationId xmlns:a16="http://schemas.microsoft.com/office/drawing/2014/main" id="{E328F155-581B-3644-68D1-89FCE4C0B4E0}"/>
+              </a:ext>
+            </a:extLst>
+          </p:cNvPr>
+          <p:cNvSpPr>
+            <a:spLocks noGrp="1"/>
+          </p:cNvSpPr>
+          <p:nvPr>
+            <p:ph type="title"/>
+          </p:nvPr>
+        </p:nvSpPr>
+        <p:spPr/>
+        <p:txBody>
+          <a:bodyPr/>
+          <a:lstStyle/>
+          <a:p>
+            <a:r>
+              <a:rPr lang="en-US" dirty="0"/>
+              <a:t>Next Steps</a:t>
+            </a:r>
+          </a:p>
+        </p:txBody>
+      </p:sp>
+      <p:sp>
+        <p:nvSpPr>
+          <p:cNvPr id="3" name="Content Placeholder 2">
+            <a:extLst>
+              <a:ext uri="{FF2B5EF4-FFF2-40B4-BE49-F238E27FC236}">
+                <a16:creationId xmlns:a16="http://schemas.microsoft.com/office/drawing/2014/main" id="{35880588-898F-6258-F378-6A084B52C455}"/>
+              </a:ext>
+            </a:extLst>
+          </p:cNvPr>
+          <p:cNvSpPr>
+            <a:spLocks noGrp="1"/>
+          </p:cNvSpPr>
+          <p:nvPr>
+            <p:ph idx="1"/>
+          </p:nvPr>
+        </p:nvSpPr>
+        <p:spPr/>
+        <p:txBody>
+          <a:bodyPr/>
+          <a:lstStyle/>
+          <a:p>
+            <a:endParaRPr lang="en-US" dirty="0"/>
+          </a:p>
+        </p:txBody>
+      </p:sp>
+    </p:spTree>
+    <p:extLst>
+      <p:ext uri="{BB962C8B-B14F-4D97-AF65-F5344CB8AC3E}">
+        <p14:creationId xmlns:p14="http://schemas.microsoft.com/office/powerpoint/2010/main" val="4075507369"/>
       </p:ext>
     </p:extLst>
   </p:cSld>

</xml_diff>